<commit_message>
cerated power point for skripsi
</commit_message>
<xml_diff>
--- a/dokumen/ppt_skripsi.pptx
+++ b/dokumen/ppt_skripsi.pptx
@@ -5,7 +5,10 @@
     <p:sldMasterId id="2147483648" r:id="rId1"/>
   </p:sldMasterIdLst>
   <p:sldIdLst>
-    <p:sldId id="256" r:id="rId2"/>
+    <p:sldId id="257" r:id="rId2"/>
+    <p:sldId id="259" r:id="rId3"/>
+    <p:sldId id="258" r:id="rId4"/>
+    <p:sldId id="256" r:id="rId5"/>
   </p:sldIdLst>
   <p:sldSz cx="12192000" cy="6858000"/>
   <p:notesSz cx="6858000" cy="9144000"/>
@@ -104,6 +107,11 @@
       </a:defRPr>
     </a:lvl9pPr>
   </p:defaultTextStyle>
+  <p:extLst>
+    <p:ext uri="{EFAFB233-063F-42B5-8137-9DF3F51BA10A}">
+      <p15:sldGuideLst xmlns:p15="http://schemas.microsoft.com/office/powerpoint/2012/main"/>
+    </p:ext>
+  </p:extLst>
 </p:presentation>
 </file>
 
@@ -256,7 +264,7 @@
           <a:p>
             <a:fld id="{F5671809-4E7C-4B4C-B35D-BEB3A7116895}" type="datetimeFigureOut">
               <a:rPr lang="en-ID" smtClean="0"/>
-              <a:t>04/06/2022</a:t>
+              <a:t>07/06/2022</a:t>
             </a:fld>
             <a:endParaRPr lang="en-ID"/>
           </a:p>
@@ -456,7 +464,7 @@
           <a:p>
             <a:fld id="{F5671809-4E7C-4B4C-B35D-BEB3A7116895}" type="datetimeFigureOut">
               <a:rPr lang="en-ID" smtClean="0"/>
-              <a:t>04/06/2022</a:t>
+              <a:t>07/06/2022</a:t>
             </a:fld>
             <a:endParaRPr lang="en-ID"/>
           </a:p>
@@ -666,7 +674,7 @@
           <a:p>
             <a:fld id="{F5671809-4E7C-4B4C-B35D-BEB3A7116895}" type="datetimeFigureOut">
               <a:rPr lang="en-ID" smtClean="0"/>
-              <a:t>04/06/2022</a:t>
+              <a:t>07/06/2022</a:t>
             </a:fld>
             <a:endParaRPr lang="en-ID"/>
           </a:p>
@@ -866,7 +874,7 @@
           <a:p>
             <a:fld id="{F5671809-4E7C-4B4C-B35D-BEB3A7116895}" type="datetimeFigureOut">
               <a:rPr lang="en-ID" smtClean="0"/>
-              <a:t>04/06/2022</a:t>
+              <a:t>07/06/2022</a:t>
             </a:fld>
             <a:endParaRPr lang="en-ID"/>
           </a:p>
@@ -1142,7 +1150,7 @@
           <a:p>
             <a:fld id="{F5671809-4E7C-4B4C-B35D-BEB3A7116895}" type="datetimeFigureOut">
               <a:rPr lang="en-ID" smtClean="0"/>
-              <a:t>04/06/2022</a:t>
+              <a:t>07/06/2022</a:t>
             </a:fld>
             <a:endParaRPr lang="en-ID"/>
           </a:p>
@@ -1410,7 +1418,7 @@
           <a:p>
             <a:fld id="{F5671809-4E7C-4B4C-B35D-BEB3A7116895}" type="datetimeFigureOut">
               <a:rPr lang="en-ID" smtClean="0"/>
-              <a:t>04/06/2022</a:t>
+              <a:t>07/06/2022</a:t>
             </a:fld>
             <a:endParaRPr lang="en-ID"/>
           </a:p>
@@ -1825,7 +1833,7 @@
           <a:p>
             <a:fld id="{F5671809-4E7C-4B4C-B35D-BEB3A7116895}" type="datetimeFigureOut">
               <a:rPr lang="en-ID" smtClean="0"/>
-              <a:t>04/06/2022</a:t>
+              <a:t>07/06/2022</a:t>
             </a:fld>
             <a:endParaRPr lang="en-ID"/>
           </a:p>
@@ -1967,7 +1975,7 @@
           <a:p>
             <a:fld id="{F5671809-4E7C-4B4C-B35D-BEB3A7116895}" type="datetimeFigureOut">
               <a:rPr lang="en-ID" smtClean="0"/>
-              <a:t>04/06/2022</a:t>
+              <a:t>07/06/2022</a:t>
             </a:fld>
             <a:endParaRPr lang="en-ID"/>
           </a:p>
@@ -2080,7 +2088,7 @@
           <a:p>
             <a:fld id="{F5671809-4E7C-4B4C-B35D-BEB3A7116895}" type="datetimeFigureOut">
               <a:rPr lang="en-ID" smtClean="0"/>
-              <a:t>04/06/2022</a:t>
+              <a:t>07/06/2022</a:t>
             </a:fld>
             <a:endParaRPr lang="en-ID"/>
           </a:p>
@@ -2393,7 +2401,7 @@
           <a:p>
             <a:fld id="{F5671809-4E7C-4B4C-B35D-BEB3A7116895}" type="datetimeFigureOut">
               <a:rPr lang="en-ID" smtClean="0"/>
-              <a:t>04/06/2022</a:t>
+              <a:t>07/06/2022</a:t>
             </a:fld>
             <a:endParaRPr lang="en-ID"/>
           </a:p>
@@ -2682,7 +2690,7 @@
           <a:p>
             <a:fld id="{F5671809-4E7C-4B4C-B35D-BEB3A7116895}" type="datetimeFigureOut">
               <a:rPr lang="en-ID" smtClean="0"/>
-              <a:t>04/06/2022</a:t>
+              <a:t>07/06/2022</a:t>
             </a:fld>
             <a:endParaRPr lang="en-ID"/>
           </a:p>
@@ -2925,7 +2933,7 @@
           <a:p>
             <a:fld id="{F5671809-4E7C-4B4C-B35D-BEB3A7116895}" type="datetimeFigureOut">
               <a:rPr lang="en-ID" smtClean="0"/>
-              <a:t>04/06/2022</a:t>
+              <a:t>07/06/2022</a:t>
             </a:fld>
             <a:endParaRPr lang="en-ID"/>
           </a:p>
@@ -3344,6 +3352,2099 @@
       </p:grpSpPr>
       <p:sp>
         <p:nvSpPr>
+          <p:cNvPr id="2" name="TextBox 1">
+            <a:extLst>
+              <a:ext uri="{FF2B5EF4-FFF2-40B4-BE49-F238E27FC236}">
+                <a16:creationId xmlns:a16="http://schemas.microsoft.com/office/drawing/2014/main" id="{F5D344A1-39FE-052D-1B9C-3C500FCD5362}"/>
+              </a:ext>
+            </a:extLst>
+          </p:cNvPr>
+          <p:cNvSpPr txBox="1"/>
+          <p:nvPr/>
+        </p:nvSpPr>
+        <p:spPr>
+          <a:xfrm>
+            <a:off x="2522375" y="2454845"/>
+            <a:ext cx="7147249" cy="1128450"/>
+          </a:xfrm>
+          <a:prstGeom prst="rect">
+            <a:avLst/>
+          </a:prstGeom>
+          <a:noFill/>
+        </p:spPr>
+        <p:txBody>
+          <a:bodyPr wrap="square" rtlCol="0">
+            <a:spAutoFit/>
+          </a:bodyPr>
+          <a:lstStyle/>
+          <a:p>
+            <a:pPr algn="ctr">
+              <a:lnSpc>
+                <a:spcPct val="107000"/>
+              </a:lnSpc>
+              <a:spcAft>
+                <a:spcPts val="800"/>
+              </a:spcAft>
+            </a:pPr>
+            <a:r>
+              <a:rPr lang="en-ID" sz="1600" b="1" spc="75" dirty="0">
+                <a:solidFill>
+                  <a:srgbClr val="000000"/>
+                </a:solidFill>
+                <a:effectLst/>
+                <a:latin typeface="Arial" panose="020B0604020202020204" pitchFamily="34" charset="0"/>
+                <a:ea typeface="Times New Roman" panose="02020603050405020304" pitchFamily="18" charset="0"/>
+                <a:cs typeface="Arial" panose="020B0604020202020204" pitchFamily="34" charset="0"/>
+              </a:rPr>
+              <a:t>PENGEMBANGAN APLIKASI MOBILE PRESENSI PEGAWAI BERBASIS </a:t>
+            </a:r>
+            <a:r>
+              <a:rPr lang="en-ID" sz="1600" b="1" i="1" spc="75" dirty="0">
+                <a:solidFill>
+                  <a:srgbClr val="000000"/>
+                </a:solidFill>
+                <a:effectLst/>
+                <a:latin typeface="Arial" panose="020B0604020202020204" pitchFamily="34" charset="0"/>
+                <a:ea typeface="Times New Roman" panose="02020603050405020304" pitchFamily="18" charset="0"/>
+                <a:cs typeface="Arial" panose="020B0604020202020204" pitchFamily="34" charset="0"/>
+              </a:rPr>
+              <a:t>GPS</a:t>
+            </a:r>
+            <a:r>
+              <a:rPr lang="en-ID" sz="1600" b="1" spc="75" dirty="0">
+                <a:solidFill>
+                  <a:srgbClr val="000000"/>
+                </a:solidFill>
+                <a:effectLst/>
+                <a:latin typeface="Arial" panose="020B0604020202020204" pitchFamily="34" charset="0"/>
+                <a:ea typeface="Times New Roman" panose="02020603050405020304" pitchFamily="18" charset="0"/>
+                <a:cs typeface="Arial" panose="020B0604020202020204" pitchFamily="34" charset="0"/>
+              </a:rPr>
+              <a:t> DAN </a:t>
+            </a:r>
+            <a:r>
+              <a:rPr lang="en-ID" sz="1600" b="1" i="1" spc="75" dirty="0">
+                <a:solidFill>
+                  <a:srgbClr val="000000"/>
+                </a:solidFill>
+                <a:effectLst/>
+                <a:latin typeface="Arial" panose="020B0604020202020204" pitchFamily="34" charset="0"/>
+                <a:ea typeface="Times New Roman" panose="02020603050405020304" pitchFamily="18" charset="0"/>
+                <a:cs typeface="Arial" panose="020B0604020202020204" pitchFamily="34" charset="0"/>
+              </a:rPr>
+              <a:t>GEOCODING </a:t>
+            </a:r>
+            <a:r>
+              <a:rPr lang="en-ID" sz="1600" b="1" spc="75" dirty="0">
+                <a:solidFill>
+                  <a:srgbClr val="000000"/>
+                </a:solidFill>
+                <a:effectLst/>
+                <a:latin typeface="Arial" panose="020B0604020202020204" pitchFamily="34" charset="0"/>
+                <a:ea typeface="Times New Roman" panose="02020603050405020304" pitchFamily="18" charset="0"/>
+                <a:cs typeface="Arial" panose="020B0604020202020204" pitchFamily="34" charset="0"/>
+              </a:rPr>
+              <a:t>MENGGUNAKAN METODE PENGUKURAN JARAK HAVERSINE [STUDI KASUS: BALAI DESA WARUREJA, KABUPATEN TEGAL]</a:t>
+            </a:r>
+            <a:endParaRPr lang="en-ID" sz="1600" spc="75" dirty="0">
+              <a:solidFill>
+                <a:srgbClr val="000000"/>
+              </a:solidFill>
+              <a:effectLst/>
+              <a:latin typeface="Arial" panose="020B0604020202020204" pitchFamily="34" charset="0"/>
+              <a:ea typeface="Times New Roman" panose="02020603050405020304" pitchFamily="18" charset="0"/>
+              <a:cs typeface="Arial" panose="020B0604020202020204" pitchFamily="34" charset="0"/>
+            </a:endParaRPr>
+          </a:p>
+        </p:txBody>
+      </p:sp>
+      <p:pic>
+        <p:nvPicPr>
+          <p:cNvPr id="3" name="Picture 2">
+            <a:extLst>
+              <a:ext uri="{FF2B5EF4-FFF2-40B4-BE49-F238E27FC236}">
+                <a16:creationId xmlns:a16="http://schemas.microsoft.com/office/drawing/2014/main" id="{7F066D29-7D8F-FA43-C481-2058A9CC61DC}"/>
+              </a:ext>
+            </a:extLst>
+          </p:cNvPr>
+          <p:cNvPicPr>
+            <a:picLocks noChangeAspect="1"/>
+          </p:cNvPicPr>
+          <p:nvPr/>
+        </p:nvPicPr>
+        <p:blipFill>
+          <a:blip r:embed="rId2">
+            <a:extLst>
+              <a:ext uri="{28A0092B-C50C-407E-A947-70E740481C1C}">
+                <a14:useLocalDpi xmlns:a14="http://schemas.microsoft.com/office/drawing/2010/main" val="0"/>
+              </a:ext>
+            </a:extLst>
+          </a:blip>
+          <a:stretch>
+            <a:fillRect/>
+          </a:stretch>
+        </p:blipFill>
+        <p:spPr>
+          <a:xfrm>
+            <a:off x="5410199" y="868355"/>
+            <a:ext cx="1371600" cy="1371600"/>
+          </a:xfrm>
+          <a:prstGeom prst="rect">
+            <a:avLst/>
+          </a:prstGeom>
+        </p:spPr>
+      </p:pic>
+      <p:sp>
+        <p:nvSpPr>
+          <p:cNvPr id="5" name="TextBox 4">
+            <a:extLst>
+              <a:ext uri="{FF2B5EF4-FFF2-40B4-BE49-F238E27FC236}">
+                <a16:creationId xmlns:a16="http://schemas.microsoft.com/office/drawing/2014/main" id="{53E14643-6F12-4DB6-320D-F12DF44B068C}"/>
+              </a:ext>
+            </a:extLst>
+          </p:cNvPr>
+          <p:cNvSpPr txBox="1"/>
+          <p:nvPr/>
+        </p:nvSpPr>
+        <p:spPr>
+          <a:xfrm>
+            <a:off x="2743200" y="3928188"/>
+            <a:ext cx="6680718" cy="830997"/>
+          </a:xfrm>
+          <a:prstGeom prst="rect">
+            <a:avLst/>
+          </a:prstGeom>
+          <a:noFill/>
+        </p:spPr>
+        <p:txBody>
+          <a:bodyPr wrap="square" rtlCol="0">
+            <a:spAutoFit/>
+          </a:bodyPr>
+          <a:lstStyle/>
+          <a:p>
+            <a:pPr algn="ctr"/>
+            <a:r>
+              <a:rPr lang="en-US" sz="1600" dirty="0">
+                <a:latin typeface="Arial" panose="020B0604020202020204" pitchFamily="34" charset="0"/>
+                <a:cs typeface="Arial" panose="020B0604020202020204" pitchFamily="34" charset="0"/>
+              </a:rPr>
+              <a:t>Guna Dermawan</a:t>
+            </a:r>
+          </a:p>
+          <a:p>
+            <a:pPr algn="ctr"/>
+            <a:r>
+              <a:rPr lang="en-US" sz="1600" dirty="0">
+                <a:latin typeface="Arial" panose="020B0604020202020204" pitchFamily="34" charset="0"/>
+                <a:cs typeface="Arial" panose="020B0604020202020204" pitchFamily="34" charset="0"/>
+              </a:rPr>
+              <a:t>A11.2018.11538</a:t>
+            </a:r>
+          </a:p>
+          <a:p>
+            <a:pPr algn="ctr"/>
+            <a:r>
+              <a:rPr lang="en-US" sz="1600" dirty="0">
+                <a:latin typeface="Arial" panose="020B0604020202020204" pitchFamily="34" charset="0"/>
+                <a:cs typeface="Arial" panose="020B0604020202020204" pitchFamily="34" charset="0"/>
+              </a:rPr>
+              <a:t>S1 – Teknik </a:t>
+            </a:r>
+            <a:r>
+              <a:rPr lang="en-US" sz="1600" dirty="0" err="1">
+                <a:latin typeface="Arial" panose="020B0604020202020204" pitchFamily="34" charset="0"/>
+                <a:cs typeface="Arial" panose="020B0604020202020204" pitchFamily="34" charset="0"/>
+              </a:rPr>
+              <a:t>Informatika</a:t>
+            </a:r>
+            <a:endParaRPr lang="en-ID" sz="1600" dirty="0">
+              <a:latin typeface="Arial" panose="020B0604020202020204" pitchFamily="34" charset="0"/>
+              <a:cs typeface="Arial" panose="020B0604020202020204" pitchFamily="34" charset="0"/>
+            </a:endParaRPr>
+          </a:p>
+        </p:txBody>
+      </p:sp>
+      <p:sp>
+        <p:nvSpPr>
+          <p:cNvPr id="6" name="TextBox 5">
+            <a:extLst>
+              <a:ext uri="{FF2B5EF4-FFF2-40B4-BE49-F238E27FC236}">
+                <a16:creationId xmlns:a16="http://schemas.microsoft.com/office/drawing/2014/main" id="{48C68885-5C70-3F56-C500-60DEA1C1A9BA}"/>
+              </a:ext>
+            </a:extLst>
+          </p:cNvPr>
+          <p:cNvSpPr txBox="1"/>
+          <p:nvPr/>
+        </p:nvSpPr>
+        <p:spPr>
+          <a:xfrm>
+            <a:off x="2743200" y="5196411"/>
+            <a:ext cx="6680718" cy="1077218"/>
+          </a:xfrm>
+          <a:prstGeom prst="rect">
+            <a:avLst/>
+          </a:prstGeom>
+          <a:noFill/>
+        </p:spPr>
+        <p:txBody>
+          <a:bodyPr wrap="square" rtlCol="0">
+            <a:spAutoFit/>
+          </a:bodyPr>
+          <a:lstStyle/>
+          <a:p>
+            <a:pPr algn="ctr"/>
+            <a:r>
+              <a:rPr lang="en-US" sz="1600" b="1" dirty="0">
+                <a:latin typeface="Arial" panose="020B0604020202020204" pitchFamily="34" charset="0"/>
+                <a:cs typeface="Arial" panose="020B0604020202020204" pitchFamily="34" charset="0"/>
+              </a:rPr>
+              <a:t>FAKULTAS ILMU KOMPUTER</a:t>
+            </a:r>
+          </a:p>
+          <a:p>
+            <a:pPr algn="ctr"/>
+            <a:r>
+              <a:rPr lang="en-US" sz="1600" b="1" dirty="0">
+                <a:latin typeface="Arial" panose="020B0604020202020204" pitchFamily="34" charset="0"/>
+                <a:cs typeface="Arial" panose="020B0604020202020204" pitchFamily="34" charset="0"/>
+              </a:rPr>
+              <a:t>UNIVERSITAS DIAN NUSWANTORO</a:t>
+            </a:r>
+          </a:p>
+          <a:p>
+            <a:pPr algn="ctr"/>
+            <a:r>
+              <a:rPr lang="en-US" sz="1600" b="1" dirty="0">
+                <a:latin typeface="Arial" panose="020B0604020202020204" pitchFamily="34" charset="0"/>
+                <a:cs typeface="Arial" panose="020B0604020202020204" pitchFamily="34" charset="0"/>
+              </a:rPr>
+              <a:t>SEMARANG</a:t>
+            </a:r>
+          </a:p>
+          <a:p>
+            <a:pPr algn="ctr"/>
+            <a:r>
+              <a:rPr lang="en-US" sz="1600" b="1" dirty="0">
+                <a:latin typeface="Arial" panose="020B0604020202020204" pitchFamily="34" charset="0"/>
+                <a:cs typeface="Arial" panose="020B0604020202020204" pitchFamily="34" charset="0"/>
+              </a:rPr>
+              <a:t>2022</a:t>
+            </a:r>
+            <a:endParaRPr lang="en-ID" sz="1600" b="1" dirty="0">
+              <a:latin typeface="Arial" panose="020B0604020202020204" pitchFamily="34" charset="0"/>
+              <a:cs typeface="Arial" panose="020B0604020202020204" pitchFamily="34" charset="0"/>
+            </a:endParaRPr>
+          </a:p>
+        </p:txBody>
+      </p:sp>
+    </p:spTree>
+    <p:extLst>
+      <p:ext uri="{BB962C8B-B14F-4D97-AF65-F5344CB8AC3E}">
+        <p14:creationId xmlns:p14="http://schemas.microsoft.com/office/powerpoint/2010/main" val="2505102128"/>
+      </p:ext>
+    </p:extLst>
+  </p:cSld>
+  <p:clrMapOvr>
+    <a:masterClrMapping/>
+  </p:clrMapOvr>
+  <mc:AlternateContent xmlns:mc="http://schemas.openxmlformats.org/markup-compatibility/2006">
+    <mc:Choice xmlns:p159="http://schemas.microsoft.com/office/powerpoint/2015/09/main" Requires="p159">
+      <p:transition xmlns:p14="http://schemas.microsoft.com/office/powerpoint/2010/main" spd="slow" p14:dur="2000">
+        <p159:morph option="byObject"/>
+      </p:transition>
+    </mc:Choice>
+    <mc:Fallback>
+      <p:transition spd="slow">
+        <p:fade/>
+      </p:transition>
+    </mc:Fallback>
+  </mc:AlternateContent>
+</p:sld>
+</file>
+
+<file path=ppt/slides/slide2.xml><?xml version="1.0" encoding="utf-8"?>
+<p:sld xmlns:a="http://schemas.openxmlformats.org/drawingml/2006/main" xmlns:r="http://schemas.openxmlformats.org/officeDocument/2006/relationships" xmlns:p="http://schemas.openxmlformats.org/presentationml/2006/main">
+  <p:cSld>
+    <p:spTree>
+      <p:nvGrpSpPr>
+        <p:cNvPr id="1" name=""/>
+        <p:cNvGrpSpPr/>
+        <p:nvPr/>
+      </p:nvGrpSpPr>
+      <p:grpSpPr>
+        <a:xfrm>
+          <a:off x="0" y="0"/>
+          <a:ext cx="0" cy="0"/>
+          <a:chOff x="0" y="0"/>
+          <a:chExt cx="0" cy="0"/>
+        </a:xfrm>
+      </p:grpSpPr>
+      <p:sp>
+        <p:nvSpPr>
+          <p:cNvPr id="2" name="TextBox 1">
+            <a:extLst>
+              <a:ext uri="{FF2B5EF4-FFF2-40B4-BE49-F238E27FC236}">
+                <a16:creationId xmlns:a16="http://schemas.microsoft.com/office/drawing/2014/main" id="{F5D344A1-39FE-052D-1B9C-3C500FCD5362}"/>
+              </a:ext>
+            </a:extLst>
+          </p:cNvPr>
+          <p:cNvSpPr txBox="1"/>
+          <p:nvPr/>
+        </p:nvSpPr>
+        <p:spPr>
+          <a:xfrm>
+            <a:off x="2522375" y="524445"/>
+            <a:ext cx="7147249" cy="458780"/>
+          </a:xfrm>
+          <a:prstGeom prst="rect">
+            <a:avLst/>
+          </a:prstGeom>
+          <a:noFill/>
+        </p:spPr>
+        <p:txBody>
+          <a:bodyPr wrap="square" rtlCol="0">
+            <a:spAutoFit/>
+          </a:bodyPr>
+          <a:lstStyle/>
+          <a:p>
+            <a:pPr algn="ctr">
+              <a:lnSpc>
+                <a:spcPct val="107000"/>
+              </a:lnSpc>
+              <a:spcAft>
+                <a:spcPts val="800"/>
+              </a:spcAft>
+            </a:pPr>
+            <a:r>
+              <a:rPr lang="en-US" sz="2400" b="1" spc="75" dirty="0">
+                <a:solidFill>
+                  <a:srgbClr val="000000"/>
+                </a:solidFill>
+                <a:latin typeface="Arial" panose="020B0604020202020204" pitchFamily="34" charset="0"/>
+                <a:ea typeface="Times New Roman" panose="02020603050405020304" pitchFamily="18" charset="0"/>
+                <a:cs typeface="Arial" panose="020B0604020202020204" pitchFamily="34" charset="0"/>
+              </a:rPr>
+              <a:t>PENDAHULUAN </a:t>
+            </a:r>
+            <a:endParaRPr lang="en-ID" sz="2400" spc="75" dirty="0">
+              <a:solidFill>
+                <a:srgbClr val="000000"/>
+              </a:solidFill>
+              <a:effectLst/>
+              <a:latin typeface="Arial" panose="020B0604020202020204" pitchFamily="34" charset="0"/>
+              <a:ea typeface="Times New Roman" panose="02020603050405020304" pitchFamily="18" charset="0"/>
+              <a:cs typeface="Arial" panose="020B0604020202020204" pitchFamily="34" charset="0"/>
+            </a:endParaRPr>
+          </a:p>
+        </p:txBody>
+      </p:sp>
+      <p:pic>
+        <p:nvPicPr>
+          <p:cNvPr id="3" name="Picture 2">
+            <a:extLst>
+              <a:ext uri="{FF2B5EF4-FFF2-40B4-BE49-F238E27FC236}">
+                <a16:creationId xmlns:a16="http://schemas.microsoft.com/office/drawing/2014/main" id="{7F066D29-7D8F-FA43-C481-2058A9CC61DC}"/>
+              </a:ext>
+            </a:extLst>
+          </p:cNvPr>
+          <p:cNvPicPr>
+            <a:picLocks noChangeAspect="1"/>
+          </p:cNvPicPr>
+          <p:nvPr/>
+        </p:nvPicPr>
+        <p:blipFill>
+          <a:blip r:embed="rId2">
+            <a:extLst>
+              <a:ext uri="{28A0092B-C50C-407E-A947-70E740481C1C}">
+                <a14:useLocalDpi xmlns:a14="http://schemas.microsoft.com/office/drawing/2010/main" val="0"/>
+              </a:ext>
+            </a:extLst>
+          </a:blip>
+          <a:stretch>
+            <a:fillRect/>
+          </a:stretch>
+        </p:blipFill>
+        <p:spPr>
+          <a:xfrm>
+            <a:off x="11161903" y="5812413"/>
+            <a:ext cx="922432" cy="922432"/>
+          </a:xfrm>
+          <a:prstGeom prst="rect">
+            <a:avLst/>
+          </a:prstGeom>
+        </p:spPr>
+      </p:pic>
+      <p:grpSp>
+        <p:nvGrpSpPr>
+          <p:cNvPr id="33" name="Group 32">
+            <a:extLst>
+              <a:ext uri="{FF2B5EF4-FFF2-40B4-BE49-F238E27FC236}">
+                <a16:creationId xmlns:a16="http://schemas.microsoft.com/office/drawing/2014/main" id="{48DFBA83-4922-1EFC-D665-FF2EE4EE71F9}"/>
+              </a:ext>
+            </a:extLst>
+          </p:cNvPr>
+          <p:cNvGrpSpPr/>
+          <p:nvPr/>
+        </p:nvGrpSpPr>
+        <p:grpSpPr>
+          <a:xfrm>
+            <a:off x="5016206" y="2468956"/>
+            <a:ext cx="2159584" cy="2055880"/>
+            <a:chOff x="5016206" y="2468956"/>
+            <a:chExt cx="2159584" cy="2055880"/>
+          </a:xfrm>
+        </p:grpSpPr>
+        <p:pic>
+          <p:nvPicPr>
+            <p:cNvPr id="6" name="Picture 5">
+              <a:extLst>
+                <a:ext uri="{FF2B5EF4-FFF2-40B4-BE49-F238E27FC236}">
+                  <a16:creationId xmlns:a16="http://schemas.microsoft.com/office/drawing/2014/main" id="{15F557CE-6190-BFB9-7215-5AD03DE330DD}"/>
+                </a:ext>
+              </a:extLst>
+            </p:cNvPr>
+            <p:cNvPicPr>
+              <a:picLocks noChangeAspect="1"/>
+            </p:cNvPicPr>
+            <p:nvPr/>
+          </p:nvPicPr>
+          <p:blipFill>
+            <a:blip r:embed="rId3">
+              <a:biLevel thresh="75000"/>
+              <a:extLst>
+                <a:ext uri="{BEBA8EAE-BF5A-486C-A8C5-ECC9F3942E4B}">
+                  <a14:imgProps xmlns:a14="http://schemas.microsoft.com/office/drawing/2010/main">
+                    <a14:imgLayer r:embed="rId4">
+                      <a14:imgEffect>
+                        <a14:sharpenSoften amount="50000"/>
+                      </a14:imgEffect>
+                    </a14:imgLayer>
+                  </a14:imgProps>
+                </a:ext>
+                <a:ext uri="{28A0092B-C50C-407E-A947-70E740481C1C}">
+                  <a14:useLocalDpi xmlns:a14="http://schemas.microsoft.com/office/drawing/2010/main" val="0"/>
+                </a:ext>
+              </a:extLst>
+            </a:blip>
+            <a:stretch>
+              <a:fillRect/>
+            </a:stretch>
+          </p:blipFill>
+          <p:spPr>
+            <a:xfrm>
+              <a:off x="5135954" y="2468956"/>
+              <a:ext cx="1920088" cy="1920088"/>
+            </a:xfrm>
+            <a:prstGeom prst="rect">
+              <a:avLst/>
+            </a:prstGeom>
+          </p:spPr>
+        </p:pic>
+        <p:sp>
+          <p:nvSpPr>
+            <p:cNvPr id="7" name="TextBox 6">
+              <a:extLst>
+                <a:ext uri="{FF2B5EF4-FFF2-40B4-BE49-F238E27FC236}">
+                  <a16:creationId xmlns:a16="http://schemas.microsoft.com/office/drawing/2014/main" id="{2D71416F-E789-3D69-3D49-D1DB8F6C300C}"/>
+                </a:ext>
+              </a:extLst>
+            </p:cNvPr>
+            <p:cNvSpPr txBox="1"/>
+            <p:nvPr/>
+          </p:nvSpPr>
+          <p:spPr>
+            <a:xfrm>
+              <a:off x="5016206" y="4186282"/>
+              <a:ext cx="2159584" cy="338554"/>
+            </a:xfrm>
+            <a:prstGeom prst="rect">
+              <a:avLst/>
+            </a:prstGeom>
+            <a:noFill/>
+          </p:spPr>
+          <p:txBody>
+            <a:bodyPr wrap="square" rtlCol="0">
+              <a:spAutoFit/>
+            </a:bodyPr>
+            <a:lstStyle/>
+            <a:p>
+              <a:r>
+                <a:rPr lang="en-US" sz="1600" b="1" dirty="0" err="1">
+                  <a:latin typeface="Arial" panose="020B0604020202020204" pitchFamily="34" charset="0"/>
+                  <a:cs typeface="Arial" panose="020B0604020202020204" pitchFamily="34" charset="0"/>
+                </a:rPr>
+                <a:t>Balai</a:t>
+              </a:r>
+              <a:r>
+                <a:rPr lang="en-US" sz="1600" b="1" dirty="0">
+                  <a:latin typeface="Arial" panose="020B0604020202020204" pitchFamily="34" charset="0"/>
+                  <a:cs typeface="Arial" panose="020B0604020202020204" pitchFamily="34" charset="0"/>
+                </a:rPr>
+                <a:t> </a:t>
+              </a:r>
+              <a:r>
+                <a:rPr lang="en-US" sz="1600" b="1" dirty="0" err="1">
+                  <a:latin typeface="Arial" panose="020B0604020202020204" pitchFamily="34" charset="0"/>
+                  <a:cs typeface="Arial" panose="020B0604020202020204" pitchFamily="34" charset="0"/>
+                </a:rPr>
+                <a:t>Desa</a:t>
+              </a:r>
+              <a:r>
+                <a:rPr lang="en-US" sz="1600" b="1" dirty="0">
+                  <a:latin typeface="Arial" panose="020B0604020202020204" pitchFamily="34" charset="0"/>
+                  <a:cs typeface="Arial" panose="020B0604020202020204" pitchFamily="34" charset="0"/>
+                </a:rPr>
+                <a:t> </a:t>
+              </a:r>
+              <a:r>
+                <a:rPr lang="en-US" sz="1600" b="1" dirty="0" err="1">
+                  <a:latin typeface="Arial" panose="020B0604020202020204" pitchFamily="34" charset="0"/>
+                  <a:cs typeface="Arial" panose="020B0604020202020204" pitchFamily="34" charset="0"/>
+                </a:rPr>
+                <a:t>Warureja</a:t>
+              </a:r>
+              <a:endParaRPr lang="en-ID" sz="1600" b="1" dirty="0">
+                <a:latin typeface="Arial" panose="020B0604020202020204" pitchFamily="34" charset="0"/>
+                <a:cs typeface="Arial" panose="020B0604020202020204" pitchFamily="34" charset="0"/>
+              </a:endParaRPr>
+            </a:p>
+          </p:txBody>
+        </p:sp>
+      </p:grpSp>
+      <p:grpSp>
+        <p:nvGrpSpPr>
+          <p:cNvPr id="29" name="Group 28">
+            <a:extLst>
+              <a:ext uri="{FF2B5EF4-FFF2-40B4-BE49-F238E27FC236}">
+                <a16:creationId xmlns:a16="http://schemas.microsoft.com/office/drawing/2014/main" id="{7052B79E-4D10-029F-7E4A-1D39EE60254D}"/>
+              </a:ext>
+            </a:extLst>
+          </p:cNvPr>
+          <p:cNvGrpSpPr/>
+          <p:nvPr/>
+        </p:nvGrpSpPr>
+        <p:grpSpPr>
+          <a:xfrm>
+            <a:off x="2493018" y="2468956"/>
+            <a:ext cx="2705425" cy="1233750"/>
+            <a:chOff x="2493018" y="2468956"/>
+            <a:chExt cx="2705425" cy="1233750"/>
+          </a:xfrm>
+        </p:grpSpPr>
+        <p:pic>
+          <p:nvPicPr>
+            <p:cNvPr id="17" name="Picture 16">
+              <a:extLst>
+                <a:ext uri="{FF2B5EF4-FFF2-40B4-BE49-F238E27FC236}">
+                  <a16:creationId xmlns:a16="http://schemas.microsoft.com/office/drawing/2014/main" id="{65A0A2C1-7C0A-A32C-7379-F8A6FA1EDC73}"/>
+                </a:ext>
+              </a:extLst>
+            </p:cNvPr>
+            <p:cNvPicPr>
+              <a:picLocks noChangeAspect="1"/>
+            </p:cNvPicPr>
+            <p:nvPr/>
+          </p:nvPicPr>
+          <p:blipFill>
+            <a:blip r:embed="rId5">
+              <a:extLst>
+                <a:ext uri="{28A0092B-C50C-407E-A947-70E740481C1C}">
+                  <a14:useLocalDpi xmlns:a14="http://schemas.microsoft.com/office/drawing/2010/main" val="0"/>
+                </a:ext>
+              </a:extLst>
+            </a:blip>
+            <a:stretch>
+              <a:fillRect/>
+            </a:stretch>
+          </p:blipFill>
+          <p:spPr>
+            <a:xfrm rot="14933640">
+              <a:off x="4009723" y="2513986"/>
+              <a:ext cx="1188720" cy="1188720"/>
+            </a:xfrm>
+            <a:prstGeom prst="rect">
+              <a:avLst/>
+            </a:prstGeom>
+          </p:spPr>
+        </p:pic>
+        <p:sp>
+          <p:nvSpPr>
+            <p:cNvPr id="18" name="TextBox 17">
+              <a:extLst>
+                <a:ext uri="{FF2B5EF4-FFF2-40B4-BE49-F238E27FC236}">
+                  <a16:creationId xmlns:a16="http://schemas.microsoft.com/office/drawing/2014/main" id="{AA897424-5653-1845-F8D3-0A373523AFBB}"/>
+                </a:ext>
+              </a:extLst>
+            </p:cNvPr>
+            <p:cNvSpPr txBox="1"/>
+            <p:nvPr/>
+          </p:nvSpPr>
+          <p:spPr>
+            <a:xfrm>
+              <a:off x="2493018" y="2468956"/>
+              <a:ext cx="1679486" cy="338554"/>
+            </a:xfrm>
+            <a:prstGeom prst="rect">
+              <a:avLst/>
+            </a:prstGeom>
+            <a:noFill/>
+          </p:spPr>
+          <p:txBody>
+            <a:bodyPr wrap="square" rtlCol="0">
+              <a:spAutoFit/>
+            </a:bodyPr>
+            <a:lstStyle/>
+            <a:p>
+              <a:pPr algn="ctr"/>
+              <a:r>
+                <a:rPr lang="en-US" sz="1600" dirty="0" err="1">
+                  <a:latin typeface="Arial" panose="020B0604020202020204" pitchFamily="34" charset="0"/>
+                  <a:cs typeface="Arial" panose="020B0604020202020204" pitchFamily="34" charset="0"/>
+                </a:rPr>
+                <a:t>Konvensional</a:t>
+              </a:r>
+              <a:r>
+                <a:rPr lang="en-US" sz="1600" dirty="0">
+                  <a:latin typeface="Arial" panose="020B0604020202020204" pitchFamily="34" charset="0"/>
+                  <a:cs typeface="Arial" panose="020B0604020202020204" pitchFamily="34" charset="0"/>
+                </a:rPr>
+                <a:t> </a:t>
+              </a:r>
+              <a:endParaRPr lang="en-ID" sz="1600" dirty="0">
+                <a:latin typeface="Arial" panose="020B0604020202020204" pitchFamily="34" charset="0"/>
+                <a:cs typeface="Arial" panose="020B0604020202020204" pitchFamily="34" charset="0"/>
+              </a:endParaRPr>
+            </a:p>
+          </p:txBody>
+        </p:sp>
+      </p:grpSp>
+      <p:grpSp>
+        <p:nvGrpSpPr>
+          <p:cNvPr id="30" name="Group 29">
+            <a:extLst>
+              <a:ext uri="{FF2B5EF4-FFF2-40B4-BE49-F238E27FC236}">
+                <a16:creationId xmlns:a16="http://schemas.microsoft.com/office/drawing/2014/main" id="{80E043C7-4455-335F-B435-E771F00BD011}"/>
+              </a:ext>
+            </a:extLst>
+          </p:cNvPr>
+          <p:cNvGrpSpPr/>
+          <p:nvPr/>
+        </p:nvGrpSpPr>
+        <p:grpSpPr>
+          <a:xfrm>
+            <a:off x="2543921" y="3312053"/>
+            <a:ext cx="2739848" cy="1323212"/>
+            <a:chOff x="2543921" y="3312053"/>
+            <a:chExt cx="2739848" cy="1323212"/>
+          </a:xfrm>
+        </p:grpSpPr>
+        <p:pic>
+          <p:nvPicPr>
+            <p:cNvPr id="19" name="Picture 18">
+              <a:extLst>
+                <a:ext uri="{FF2B5EF4-FFF2-40B4-BE49-F238E27FC236}">
+                  <a16:creationId xmlns:a16="http://schemas.microsoft.com/office/drawing/2014/main" id="{4E2F812B-FFE7-C35F-40A7-7B95CE2E2576}"/>
+                </a:ext>
+              </a:extLst>
+            </p:cNvPr>
+            <p:cNvPicPr>
+              <a:picLocks noChangeAspect="1"/>
+            </p:cNvPicPr>
+            <p:nvPr/>
+          </p:nvPicPr>
+          <p:blipFill>
+            <a:blip r:embed="rId5">
+              <a:extLst>
+                <a:ext uri="{28A0092B-C50C-407E-A947-70E740481C1C}">
+                  <a14:useLocalDpi xmlns:a14="http://schemas.microsoft.com/office/drawing/2010/main" val="0"/>
+                </a:ext>
+              </a:extLst>
+            </a:blip>
+            <a:stretch>
+              <a:fillRect/>
+            </a:stretch>
+          </p:blipFill>
+          <p:spPr>
+            <a:xfrm rot="11750969">
+              <a:off x="4095049" y="3312053"/>
+              <a:ext cx="1188720" cy="1188720"/>
+            </a:xfrm>
+            <a:prstGeom prst="rect">
+              <a:avLst/>
+            </a:prstGeom>
+          </p:spPr>
+        </p:pic>
+        <p:sp>
+          <p:nvSpPr>
+            <p:cNvPr id="20" name="TextBox 19">
+              <a:extLst>
+                <a:ext uri="{FF2B5EF4-FFF2-40B4-BE49-F238E27FC236}">
+                  <a16:creationId xmlns:a16="http://schemas.microsoft.com/office/drawing/2014/main" id="{EC6E8821-B9CC-A032-BB61-AF2547FD0FB9}"/>
+                </a:ext>
+              </a:extLst>
+            </p:cNvPr>
+            <p:cNvSpPr txBox="1"/>
+            <p:nvPr/>
+          </p:nvSpPr>
+          <p:spPr>
+            <a:xfrm>
+              <a:off x="2543921" y="4050490"/>
+              <a:ext cx="1679486" cy="584775"/>
+            </a:xfrm>
+            <a:prstGeom prst="rect">
+              <a:avLst/>
+            </a:prstGeom>
+            <a:noFill/>
+          </p:spPr>
+          <p:txBody>
+            <a:bodyPr wrap="square" rtlCol="0">
+              <a:spAutoFit/>
+            </a:bodyPr>
+            <a:lstStyle/>
+            <a:p>
+              <a:pPr algn="ctr"/>
+              <a:r>
+                <a:rPr lang="en-US" sz="1600" dirty="0" err="1">
+                  <a:latin typeface="Arial" panose="020B0604020202020204" pitchFamily="34" charset="0"/>
+                  <a:cs typeface="Arial" panose="020B0604020202020204" pitchFamily="34" charset="0"/>
+                </a:rPr>
+                <a:t>Rekapitulasi</a:t>
+              </a:r>
+              <a:r>
+                <a:rPr lang="en-US" sz="1600" dirty="0">
+                  <a:latin typeface="Arial" panose="020B0604020202020204" pitchFamily="34" charset="0"/>
+                  <a:cs typeface="Arial" panose="020B0604020202020204" pitchFamily="34" charset="0"/>
+                </a:rPr>
+                <a:t> </a:t>
+              </a:r>
+              <a:r>
+                <a:rPr lang="en-US" sz="1600" dirty="0" err="1">
+                  <a:latin typeface="Arial" panose="020B0604020202020204" pitchFamily="34" charset="0"/>
+                  <a:cs typeface="Arial" panose="020B0604020202020204" pitchFamily="34" charset="0"/>
+                </a:rPr>
+                <a:t>presensi</a:t>
+              </a:r>
+              <a:endParaRPr lang="en-ID" sz="1600" dirty="0">
+                <a:latin typeface="Arial" panose="020B0604020202020204" pitchFamily="34" charset="0"/>
+                <a:cs typeface="Arial" panose="020B0604020202020204" pitchFamily="34" charset="0"/>
+              </a:endParaRPr>
+            </a:p>
+          </p:txBody>
+        </p:sp>
+      </p:grpSp>
+      <p:grpSp>
+        <p:nvGrpSpPr>
+          <p:cNvPr id="24" name="Group 23">
+            <a:extLst>
+              <a:ext uri="{FF2B5EF4-FFF2-40B4-BE49-F238E27FC236}">
+                <a16:creationId xmlns:a16="http://schemas.microsoft.com/office/drawing/2014/main" id="{E2558761-0DE3-B41A-E383-AB9F823A1150}"/>
+              </a:ext>
+            </a:extLst>
+          </p:cNvPr>
+          <p:cNvGrpSpPr/>
+          <p:nvPr/>
+        </p:nvGrpSpPr>
+        <p:grpSpPr>
+          <a:xfrm>
+            <a:off x="5016206" y="1412236"/>
+            <a:ext cx="2159584" cy="1288315"/>
+            <a:chOff x="5016206" y="1418764"/>
+            <a:chExt cx="2159584" cy="1288315"/>
+          </a:xfrm>
+        </p:grpSpPr>
+        <p:pic>
+          <p:nvPicPr>
+            <p:cNvPr id="12" name="Picture 11">
+              <a:extLst>
+                <a:ext uri="{FF2B5EF4-FFF2-40B4-BE49-F238E27FC236}">
+                  <a16:creationId xmlns:a16="http://schemas.microsoft.com/office/drawing/2014/main" id="{DBB53589-0DAD-53CC-619F-A15C87246931}"/>
+                </a:ext>
+              </a:extLst>
+            </p:cNvPr>
+            <p:cNvPicPr>
+              <a:picLocks noChangeAspect="1"/>
+            </p:cNvPicPr>
+            <p:nvPr/>
+          </p:nvPicPr>
+          <p:blipFill>
+            <a:blip r:embed="rId6">
+              <a:extLst>
+                <a:ext uri="{BEBA8EAE-BF5A-486C-A8C5-ECC9F3942E4B}">
+                  <a14:imgProps xmlns:a14="http://schemas.microsoft.com/office/drawing/2010/main">
+                    <a14:imgLayer r:embed="rId7">
+                      <a14:imgEffect>
+                        <a14:sharpenSoften amount="50000"/>
+                      </a14:imgEffect>
+                    </a14:imgLayer>
+                  </a14:imgProps>
+                </a:ext>
+                <a:ext uri="{28A0092B-C50C-407E-A947-70E740481C1C}">
+                  <a14:useLocalDpi xmlns:a14="http://schemas.microsoft.com/office/drawing/2010/main" val="0"/>
+                </a:ext>
+              </a:extLst>
+            </a:blip>
+            <a:stretch>
+              <a:fillRect/>
+            </a:stretch>
+          </p:blipFill>
+          <p:spPr>
+            <a:xfrm>
+              <a:off x="5638798" y="1418764"/>
+              <a:ext cx="914400" cy="914400"/>
+            </a:xfrm>
+            <a:prstGeom prst="rect">
+              <a:avLst/>
+            </a:prstGeom>
+          </p:spPr>
+        </p:pic>
+        <p:sp>
+          <p:nvSpPr>
+            <p:cNvPr id="23" name="TextBox 22">
+              <a:extLst>
+                <a:ext uri="{FF2B5EF4-FFF2-40B4-BE49-F238E27FC236}">
+                  <a16:creationId xmlns:a16="http://schemas.microsoft.com/office/drawing/2014/main" id="{AB844ACD-1540-B1DD-9DFC-F21425A2E70C}"/>
+                </a:ext>
+              </a:extLst>
+            </p:cNvPr>
+            <p:cNvSpPr txBox="1"/>
+            <p:nvPr/>
+          </p:nvSpPr>
+          <p:spPr>
+            <a:xfrm>
+              <a:off x="5016206" y="2368525"/>
+              <a:ext cx="2159584" cy="338554"/>
+            </a:xfrm>
+            <a:prstGeom prst="rect">
+              <a:avLst/>
+            </a:prstGeom>
+            <a:noFill/>
+          </p:spPr>
+          <p:txBody>
+            <a:bodyPr wrap="square" rtlCol="0">
+              <a:spAutoFit/>
+            </a:bodyPr>
+            <a:lstStyle/>
+            <a:p>
+              <a:pPr algn="ctr"/>
+              <a:r>
+                <a:rPr lang="en-US" sz="1600" b="1" dirty="0">
+                  <a:solidFill>
+                    <a:srgbClr val="F2472C"/>
+                  </a:solidFill>
+                  <a:latin typeface="Arial" panose="020B0604020202020204" pitchFamily="34" charset="0"/>
+                  <a:cs typeface="Arial" panose="020B0604020202020204" pitchFamily="34" charset="0"/>
+                </a:rPr>
+                <a:t>PRESENSI</a:t>
+              </a:r>
+              <a:endParaRPr lang="en-ID" sz="1600" b="1" dirty="0">
+                <a:solidFill>
+                  <a:srgbClr val="F2472C"/>
+                </a:solidFill>
+                <a:latin typeface="Arial" panose="020B0604020202020204" pitchFamily="34" charset="0"/>
+                <a:cs typeface="Arial" panose="020B0604020202020204" pitchFamily="34" charset="0"/>
+              </a:endParaRPr>
+            </a:p>
+          </p:txBody>
+        </p:sp>
+      </p:grpSp>
+      <p:grpSp>
+        <p:nvGrpSpPr>
+          <p:cNvPr id="31" name="Group 30">
+            <a:extLst>
+              <a:ext uri="{FF2B5EF4-FFF2-40B4-BE49-F238E27FC236}">
+                <a16:creationId xmlns:a16="http://schemas.microsoft.com/office/drawing/2014/main" id="{37CDC83C-B9A9-9FB8-2676-3AF8FAC68277}"/>
+              </a:ext>
+            </a:extLst>
+          </p:cNvPr>
+          <p:cNvGrpSpPr/>
+          <p:nvPr/>
+        </p:nvGrpSpPr>
+        <p:grpSpPr>
+          <a:xfrm>
+            <a:off x="6983465" y="3312053"/>
+            <a:ext cx="2932699" cy="1188720"/>
+            <a:chOff x="6983465" y="3312053"/>
+            <a:chExt cx="2932699" cy="1188720"/>
+          </a:xfrm>
+        </p:grpSpPr>
+        <p:pic>
+          <p:nvPicPr>
+            <p:cNvPr id="25" name="Picture 24">
+              <a:extLst>
+                <a:ext uri="{FF2B5EF4-FFF2-40B4-BE49-F238E27FC236}">
+                  <a16:creationId xmlns:a16="http://schemas.microsoft.com/office/drawing/2014/main" id="{37337C13-F79C-F459-4D3D-06B26A65448F}"/>
+                </a:ext>
+              </a:extLst>
+            </p:cNvPr>
+            <p:cNvPicPr>
+              <a:picLocks noChangeAspect="1"/>
+            </p:cNvPicPr>
+            <p:nvPr/>
+          </p:nvPicPr>
+          <p:blipFill>
+            <a:blip r:embed="rId5">
+              <a:extLst>
+                <a:ext uri="{28A0092B-C50C-407E-A947-70E740481C1C}">
+                  <a14:useLocalDpi xmlns:a14="http://schemas.microsoft.com/office/drawing/2010/main" val="0"/>
+                </a:ext>
+              </a:extLst>
+            </a:blip>
+            <a:stretch>
+              <a:fillRect/>
+            </a:stretch>
+          </p:blipFill>
+          <p:spPr>
+            <a:xfrm rot="4042613">
+              <a:off x="6983465" y="3312053"/>
+              <a:ext cx="1188720" cy="1188720"/>
+            </a:xfrm>
+            <a:prstGeom prst="rect">
+              <a:avLst/>
+            </a:prstGeom>
+          </p:spPr>
+        </p:pic>
+        <p:sp>
+          <p:nvSpPr>
+            <p:cNvPr id="26" name="TextBox 25">
+              <a:extLst>
+                <a:ext uri="{FF2B5EF4-FFF2-40B4-BE49-F238E27FC236}">
+                  <a16:creationId xmlns:a16="http://schemas.microsoft.com/office/drawing/2014/main" id="{D6CB32D7-CF1B-EE3A-152F-BEE7EA4660FD}"/>
+                </a:ext>
+              </a:extLst>
+            </p:cNvPr>
+            <p:cNvSpPr txBox="1"/>
+            <p:nvPr/>
+          </p:nvSpPr>
+          <p:spPr>
+            <a:xfrm>
+              <a:off x="8236678" y="4023073"/>
+              <a:ext cx="1679486" cy="338554"/>
+            </a:xfrm>
+            <a:prstGeom prst="rect">
+              <a:avLst/>
+            </a:prstGeom>
+            <a:noFill/>
+          </p:spPr>
+          <p:txBody>
+            <a:bodyPr wrap="square" rtlCol="0">
+              <a:spAutoFit/>
+            </a:bodyPr>
+            <a:lstStyle/>
+            <a:p>
+              <a:pPr algn="ctr"/>
+              <a:r>
+                <a:rPr lang="en-US" sz="1600" dirty="0" err="1">
+                  <a:latin typeface="Arial" panose="020B0604020202020204" pitchFamily="34" charset="0"/>
+                  <a:cs typeface="Arial" panose="020B0604020202020204" pitchFamily="34" charset="0"/>
+                </a:rPr>
+                <a:t>kedisplinan</a:t>
+              </a:r>
+              <a:endParaRPr lang="en-ID" sz="1600" dirty="0">
+                <a:latin typeface="Arial" panose="020B0604020202020204" pitchFamily="34" charset="0"/>
+                <a:cs typeface="Arial" panose="020B0604020202020204" pitchFamily="34" charset="0"/>
+              </a:endParaRPr>
+            </a:p>
+          </p:txBody>
+        </p:sp>
+      </p:grpSp>
+      <p:grpSp>
+        <p:nvGrpSpPr>
+          <p:cNvPr id="32" name="Group 31">
+            <a:extLst>
+              <a:ext uri="{FF2B5EF4-FFF2-40B4-BE49-F238E27FC236}">
+                <a16:creationId xmlns:a16="http://schemas.microsoft.com/office/drawing/2014/main" id="{C0EEB66A-4A19-43C6-E172-70E32A9FC269}"/>
+              </a:ext>
+            </a:extLst>
+          </p:cNvPr>
+          <p:cNvGrpSpPr/>
+          <p:nvPr/>
+        </p:nvGrpSpPr>
+        <p:grpSpPr>
+          <a:xfrm>
+            <a:off x="7029832" y="2577963"/>
+            <a:ext cx="2886332" cy="1188720"/>
+            <a:chOff x="7029832" y="2577963"/>
+            <a:chExt cx="2886332" cy="1188720"/>
+          </a:xfrm>
+        </p:grpSpPr>
+        <p:pic>
+          <p:nvPicPr>
+            <p:cNvPr id="27" name="Picture 26">
+              <a:extLst>
+                <a:ext uri="{FF2B5EF4-FFF2-40B4-BE49-F238E27FC236}">
+                  <a16:creationId xmlns:a16="http://schemas.microsoft.com/office/drawing/2014/main" id="{8DF2A185-D50F-F04C-9DA9-26DBD379C8DA}"/>
+                </a:ext>
+              </a:extLst>
+            </p:cNvPr>
+            <p:cNvPicPr>
+              <a:picLocks noChangeAspect="1"/>
+            </p:cNvPicPr>
+            <p:nvPr/>
+          </p:nvPicPr>
+          <p:blipFill>
+            <a:blip r:embed="rId5">
+              <a:extLst>
+                <a:ext uri="{28A0092B-C50C-407E-A947-70E740481C1C}">
+                  <a14:useLocalDpi xmlns:a14="http://schemas.microsoft.com/office/drawing/2010/main" val="0"/>
+                </a:ext>
+              </a:extLst>
+            </a:blip>
+            <a:stretch>
+              <a:fillRect/>
+            </a:stretch>
+          </p:blipFill>
+          <p:spPr>
+            <a:xfrm rot="1166516">
+              <a:off x="7029832" y="2577963"/>
+              <a:ext cx="1188720" cy="1188720"/>
+            </a:xfrm>
+            <a:prstGeom prst="rect">
+              <a:avLst/>
+            </a:prstGeom>
+          </p:spPr>
+        </p:pic>
+        <p:sp>
+          <p:nvSpPr>
+            <p:cNvPr id="28" name="TextBox 27">
+              <a:extLst>
+                <a:ext uri="{FF2B5EF4-FFF2-40B4-BE49-F238E27FC236}">
+                  <a16:creationId xmlns:a16="http://schemas.microsoft.com/office/drawing/2014/main" id="{2729F611-AA94-C24B-F508-AC4AD3A323CD}"/>
+                </a:ext>
+              </a:extLst>
+            </p:cNvPr>
+            <p:cNvSpPr txBox="1"/>
+            <p:nvPr/>
+          </p:nvSpPr>
+          <p:spPr>
+            <a:xfrm>
+              <a:off x="8236678" y="2764589"/>
+              <a:ext cx="1679486" cy="584775"/>
+            </a:xfrm>
+            <a:prstGeom prst="rect">
+              <a:avLst/>
+            </a:prstGeom>
+            <a:noFill/>
+          </p:spPr>
+          <p:txBody>
+            <a:bodyPr wrap="square" rtlCol="0">
+              <a:spAutoFit/>
+            </a:bodyPr>
+            <a:lstStyle/>
+            <a:p>
+              <a:pPr algn="ctr"/>
+              <a:r>
+                <a:rPr lang="en-US" sz="1600" dirty="0" err="1">
+                  <a:latin typeface="Arial" panose="020B0604020202020204" pitchFamily="34" charset="0"/>
+                  <a:cs typeface="Arial" panose="020B0604020202020204" pitchFamily="34" charset="0"/>
+                </a:rPr>
+                <a:t>Pengambilan</a:t>
+              </a:r>
+              <a:r>
+                <a:rPr lang="en-US" sz="1600" dirty="0">
+                  <a:latin typeface="Arial" panose="020B0604020202020204" pitchFamily="34" charset="0"/>
+                  <a:cs typeface="Arial" panose="020B0604020202020204" pitchFamily="34" charset="0"/>
+                </a:rPr>
+                <a:t> </a:t>
+              </a:r>
+              <a:r>
+                <a:rPr lang="en-US" sz="1600" dirty="0" err="1">
+                  <a:latin typeface="Arial" panose="020B0604020202020204" pitchFamily="34" charset="0"/>
+                  <a:cs typeface="Arial" panose="020B0604020202020204" pitchFamily="34" charset="0"/>
+                </a:rPr>
+                <a:t>keputusan</a:t>
+              </a:r>
+              <a:r>
+                <a:rPr lang="en-US" sz="1600" dirty="0">
+                  <a:latin typeface="Arial" panose="020B0604020202020204" pitchFamily="34" charset="0"/>
+                  <a:cs typeface="Arial" panose="020B0604020202020204" pitchFamily="34" charset="0"/>
+                </a:rPr>
+                <a:t> </a:t>
+              </a:r>
+              <a:endParaRPr lang="en-ID" sz="1600" dirty="0">
+                <a:latin typeface="Arial" panose="020B0604020202020204" pitchFamily="34" charset="0"/>
+                <a:cs typeface="Arial" panose="020B0604020202020204" pitchFamily="34" charset="0"/>
+              </a:endParaRPr>
+            </a:p>
+          </p:txBody>
+        </p:sp>
+      </p:grpSp>
+    </p:spTree>
+    <p:extLst>
+      <p:ext uri="{BB962C8B-B14F-4D97-AF65-F5344CB8AC3E}">
+        <p14:creationId xmlns:p14="http://schemas.microsoft.com/office/powerpoint/2010/main" val="3311337874"/>
+      </p:ext>
+    </p:extLst>
+  </p:cSld>
+  <p:clrMapOvr>
+    <a:masterClrMapping/>
+  </p:clrMapOvr>
+  <mc:AlternateContent xmlns:mc="http://schemas.openxmlformats.org/markup-compatibility/2006">
+    <mc:Choice xmlns:p159="http://schemas.microsoft.com/office/powerpoint/2015/09/main" Requires="p159">
+      <p:transition xmlns:p14="http://schemas.microsoft.com/office/powerpoint/2010/main" spd="slow" p14:dur="2000">
+        <p159:morph option="byObject"/>
+      </p:transition>
+    </mc:Choice>
+    <mc:Fallback>
+      <p:transition spd="slow">
+        <p:fade/>
+      </p:transition>
+    </mc:Fallback>
+  </mc:AlternateContent>
+  <p:timing>
+    <p:tnLst>
+      <p:par>
+        <p:cTn id="1" dur="indefinite" restart="never" nodeType="tmRoot">
+          <p:childTnLst>
+            <p:seq concurrent="1" nextAc="seek">
+              <p:cTn id="2" dur="indefinite" nodeType="mainSeq">
+                <p:childTnLst>
+                  <p:par>
+                    <p:cTn id="3" fill="hold">
+                      <p:stCondLst>
+                        <p:cond delay="indefinite"/>
+                      </p:stCondLst>
+                      <p:childTnLst>
+                        <p:par>
+                          <p:cTn id="4" fill="hold">
+                            <p:stCondLst>
+                              <p:cond delay="0"/>
+                            </p:stCondLst>
+                            <p:childTnLst>
+                              <p:par>
+                                <p:cTn id="5" presetID="42" presetClass="entr" presetSubtype="0" fill="hold" nodeType="clickEffect">
+                                  <p:stCondLst>
+                                    <p:cond delay="0"/>
+                                  </p:stCondLst>
+                                  <p:childTnLst>
+                                    <p:set>
+                                      <p:cBhvr>
+                                        <p:cTn id="6" dur="1" fill="hold">
+                                          <p:stCondLst>
+                                            <p:cond delay="0"/>
+                                          </p:stCondLst>
+                                        </p:cTn>
+                                        <p:tgtEl>
+                                          <p:spTgt spid="24"/>
+                                        </p:tgtEl>
+                                        <p:attrNameLst>
+                                          <p:attrName>style.visibility</p:attrName>
+                                        </p:attrNameLst>
+                                      </p:cBhvr>
+                                      <p:to>
+                                        <p:strVal val="visible"/>
+                                      </p:to>
+                                    </p:set>
+                                    <p:animEffect transition="in" filter="fade">
+                                      <p:cBhvr>
+                                        <p:cTn id="7" dur="1000"/>
+                                        <p:tgtEl>
+                                          <p:spTgt spid="24"/>
+                                        </p:tgtEl>
+                                      </p:cBhvr>
+                                    </p:animEffect>
+                                    <p:anim calcmode="lin" valueType="num">
+                                      <p:cBhvr>
+                                        <p:cTn id="8" dur="1000" fill="hold"/>
+                                        <p:tgtEl>
+                                          <p:spTgt spid="24"/>
+                                        </p:tgtEl>
+                                        <p:attrNameLst>
+                                          <p:attrName>ppt_x</p:attrName>
+                                        </p:attrNameLst>
+                                      </p:cBhvr>
+                                      <p:tavLst>
+                                        <p:tav tm="0">
+                                          <p:val>
+                                            <p:strVal val="#ppt_x"/>
+                                          </p:val>
+                                        </p:tav>
+                                        <p:tav tm="100000">
+                                          <p:val>
+                                            <p:strVal val="#ppt_x"/>
+                                          </p:val>
+                                        </p:tav>
+                                      </p:tavLst>
+                                    </p:anim>
+                                    <p:anim calcmode="lin" valueType="num">
+                                      <p:cBhvr>
+                                        <p:cTn id="9" dur="1000" fill="hold"/>
+                                        <p:tgtEl>
+                                          <p:spTgt spid="24"/>
+                                        </p:tgtEl>
+                                        <p:attrNameLst>
+                                          <p:attrName>ppt_y</p:attrName>
+                                        </p:attrNameLst>
+                                      </p:cBhvr>
+                                      <p:tavLst>
+                                        <p:tav tm="0">
+                                          <p:val>
+                                            <p:strVal val="#ppt_y+.1"/>
+                                          </p:val>
+                                        </p:tav>
+                                        <p:tav tm="100000">
+                                          <p:val>
+                                            <p:strVal val="#ppt_y"/>
+                                          </p:val>
+                                        </p:tav>
+                                      </p:tavLst>
+                                    </p:anim>
+                                  </p:childTnLst>
+                                </p:cTn>
+                              </p:par>
+                            </p:childTnLst>
+                          </p:cTn>
+                        </p:par>
+                      </p:childTnLst>
+                    </p:cTn>
+                  </p:par>
+                  <p:par>
+                    <p:cTn id="10" fill="hold">
+                      <p:stCondLst>
+                        <p:cond delay="indefinite"/>
+                      </p:stCondLst>
+                      <p:childTnLst>
+                        <p:par>
+                          <p:cTn id="11" fill="hold">
+                            <p:stCondLst>
+                              <p:cond delay="0"/>
+                            </p:stCondLst>
+                            <p:childTnLst>
+                              <p:par>
+                                <p:cTn id="12" presetID="10" presetClass="entr" presetSubtype="0" fill="hold" nodeType="clickEffect">
+                                  <p:stCondLst>
+                                    <p:cond delay="0"/>
+                                  </p:stCondLst>
+                                  <p:childTnLst>
+                                    <p:set>
+                                      <p:cBhvr>
+                                        <p:cTn id="13" dur="1" fill="hold">
+                                          <p:stCondLst>
+                                            <p:cond delay="0"/>
+                                          </p:stCondLst>
+                                        </p:cTn>
+                                        <p:tgtEl>
+                                          <p:spTgt spid="29"/>
+                                        </p:tgtEl>
+                                        <p:attrNameLst>
+                                          <p:attrName>style.visibility</p:attrName>
+                                        </p:attrNameLst>
+                                      </p:cBhvr>
+                                      <p:to>
+                                        <p:strVal val="visible"/>
+                                      </p:to>
+                                    </p:set>
+                                    <p:animEffect transition="in" filter="fade">
+                                      <p:cBhvr>
+                                        <p:cTn id="14" dur="500"/>
+                                        <p:tgtEl>
+                                          <p:spTgt spid="29"/>
+                                        </p:tgtEl>
+                                      </p:cBhvr>
+                                    </p:animEffect>
+                                  </p:childTnLst>
+                                </p:cTn>
+                              </p:par>
+                            </p:childTnLst>
+                          </p:cTn>
+                        </p:par>
+                      </p:childTnLst>
+                    </p:cTn>
+                  </p:par>
+                  <p:par>
+                    <p:cTn id="15" fill="hold">
+                      <p:stCondLst>
+                        <p:cond delay="indefinite"/>
+                      </p:stCondLst>
+                      <p:childTnLst>
+                        <p:par>
+                          <p:cTn id="16" fill="hold">
+                            <p:stCondLst>
+                              <p:cond delay="0"/>
+                            </p:stCondLst>
+                            <p:childTnLst>
+                              <p:par>
+                                <p:cTn id="17" presetID="10" presetClass="entr" presetSubtype="0" fill="hold" nodeType="clickEffect">
+                                  <p:stCondLst>
+                                    <p:cond delay="0"/>
+                                  </p:stCondLst>
+                                  <p:childTnLst>
+                                    <p:set>
+                                      <p:cBhvr>
+                                        <p:cTn id="18" dur="1" fill="hold">
+                                          <p:stCondLst>
+                                            <p:cond delay="0"/>
+                                          </p:stCondLst>
+                                        </p:cTn>
+                                        <p:tgtEl>
+                                          <p:spTgt spid="30"/>
+                                        </p:tgtEl>
+                                        <p:attrNameLst>
+                                          <p:attrName>style.visibility</p:attrName>
+                                        </p:attrNameLst>
+                                      </p:cBhvr>
+                                      <p:to>
+                                        <p:strVal val="visible"/>
+                                      </p:to>
+                                    </p:set>
+                                    <p:animEffect transition="in" filter="fade">
+                                      <p:cBhvr>
+                                        <p:cTn id="19" dur="500"/>
+                                        <p:tgtEl>
+                                          <p:spTgt spid="30"/>
+                                        </p:tgtEl>
+                                      </p:cBhvr>
+                                    </p:animEffect>
+                                  </p:childTnLst>
+                                </p:cTn>
+                              </p:par>
+                            </p:childTnLst>
+                          </p:cTn>
+                        </p:par>
+                      </p:childTnLst>
+                    </p:cTn>
+                  </p:par>
+                  <p:par>
+                    <p:cTn id="20" fill="hold">
+                      <p:stCondLst>
+                        <p:cond delay="indefinite"/>
+                      </p:stCondLst>
+                      <p:childTnLst>
+                        <p:par>
+                          <p:cTn id="21" fill="hold">
+                            <p:stCondLst>
+                              <p:cond delay="0"/>
+                            </p:stCondLst>
+                            <p:childTnLst>
+                              <p:par>
+                                <p:cTn id="22" presetID="10" presetClass="entr" presetSubtype="0" fill="hold" nodeType="clickEffect">
+                                  <p:stCondLst>
+                                    <p:cond delay="0"/>
+                                  </p:stCondLst>
+                                  <p:childTnLst>
+                                    <p:set>
+                                      <p:cBhvr>
+                                        <p:cTn id="23" dur="1" fill="hold">
+                                          <p:stCondLst>
+                                            <p:cond delay="0"/>
+                                          </p:stCondLst>
+                                        </p:cTn>
+                                        <p:tgtEl>
+                                          <p:spTgt spid="31"/>
+                                        </p:tgtEl>
+                                        <p:attrNameLst>
+                                          <p:attrName>style.visibility</p:attrName>
+                                        </p:attrNameLst>
+                                      </p:cBhvr>
+                                      <p:to>
+                                        <p:strVal val="visible"/>
+                                      </p:to>
+                                    </p:set>
+                                    <p:animEffect transition="in" filter="fade">
+                                      <p:cBhvr>
+                                        <p:cTn id="24" dur="500"/>
+                                        <p:tgtEl>
+                                          <p:spTgt spid="31"/>
+                                        </p:tgtEl>
+                                      </p:cBhvr>
+                                    </p:animEffect>
+                                  </p:childTnLst>
+                                </p:cTn>
+                              </p:par>
+                            </p:childTnLst>
+                          </p:cTn>
+                        </p:par>
+                      </p:childTnLst>
+                    </p:cTn>
+                  </p:par>
+                  <p:par>
+                    <p:cTn id="25" fill="hold">
+                      <p:stCondLst>
+                        <p:cond delay="indefinite"/>
+                      </p:stCondLst>
+                      <p:childTnLst>
+                        <p:par>
+                          <p:cTn id="26" fill="hold">
+                            <p:stCondLst>
+                              <p:cond delay="0"/>
+                            </p:stCondLst>
+                            <p:childTnLst>
+                              <p:par>
+                                <p:cTn id="27" presetID="10" presetClass="entr" presetSubtype="0" fill="hold" nodeType="clickEffect">
+                                  <p:stCondLst>
+                                    <p:cond delay="0"/>
+                                  </p:stCondLst>
+                                  <p:childTnLst>
+                                    <p:set>
+                                      <p:cBhvr>
+                                        <p:cTn id="28" dur="1" fill="hold">
+                                          <p:stCondLst>
+                                            <p:cond delay="0"/>
+                                          </p:stCondLst>
+                                        </p:cTn>
+                                        <p:tgtEl>
+                                          <p:spTgt spid="32"/>
+                                        </p:tgtEl>
+                                        <p:attrNameLst>
+                                          <p:attrName>style.visibility</p:attrName>
+                                        </p:attrNameLst>
+                                      </p:cBhvr>
+                                      <p:to>
+                                        <p:strVal val="visible"/>
+                                      </p:to>
+                                    </p:set>
+                                    <p:animEffect transition="in" filter="fade">
+                                      <p:cBhvr>
+                                        <p:cTn id="29" dur="500"/>
+                                        <p:tgtEl>
+                                          <p:spTgt spid="32"/>
+                                        </p:tgtEl>
+                                      </p:cBhvr>
+                                    </p:animEffect>
+                                  </p:childTnLst>
+                                </p:cTn>
+                              </p:par>
+                            </p:childTnLst>
+                          </p:cTn>
+                        </p:par>
+                      </p:childTnLst>
+                    </p:cTn>
+                  </p:par>
+                </p:childTnLst>
+              </p:cTn>
+              <p:prevCondLst>
+                <p:cond evt="onPrev" delay="0">
+                  <p:tgtEl>
+                    <p:sldTgt/>
+                  </p:tgtEl>
+                </p:cond>
+              </p:prevCondLst>
+              <p:nextCondLst>
+                <p:cond evt="onNext" delay="0">
+                  <p:tgtEl>
+                    <p:sldTgt/>
+                  </p:tgtEl>
+                </p:cond>
+              </p:nextCondLst>
+            </p:seq>
+          </p:childTnLst>
+        </p:cTn>
+      </p:par>
+    </p:tnLst>
+  </p:timing>
+</p:sld>
+</file>
+
+<file path=ppt/slides/slide3.xml><?xml version="1.0" encoding="utf-8"?>
+<p:sld xmlns:a="http://schemas.openxmlformats.org/drawingml/2006/main" xmlns:r="http://schemas.openxmlformats.org/officeDocument/2006/relationships" xmlns:p="http://schemas.openxmlformats.org/presentationml/2006/main">
+  <p:cSld>
+    <p:bg>
+      <p:bgPr>
+        <a:solidFill>
+          <a:schemeClr val="bg1"/>
+        </a:solidFill>
+        <a:effectLst/>
+      </p:bgPr>
+    </p:bg>
+    <p:spTree>
+      <p:nvGrpSpPr>
+        <p:cNvPr id="1" name=""/>
+        <p:cNvGrpSpPr/>
+        <p:nvPr/>
+      </p:nvGrpSpPr>
+      <p:grpSpPr>
+        <a:xfrm>
+          <a:off x="0" y="0"/>
+          <a:ext cx="0" cy="0"/>
+          <a:chOff x="0" y="0"/>
+          <a:chExt cx="0" cy="0"/>
+        </a:xfrm>
+      </p:grpSpPr>
+      <p:sp>
+        <p:nvSpPr>
+          <p:cNvPr id="2" name="TextBox 1">
+            <a:extLst>
+              <a:ext uri="{FF2B5EF4-FFF2-40B4-BE49-F238E27FC236}">
+                <a16:creationId xmlns:a16="http://schemas.microsoft.com/office/drawing/2014/main" id="{F5D344A1-39FE-052D-1B9C-3C500FCD5362}"/>
+              </a:ext>
+            </a:extLst>
+          </p:cNvPr>
+          <p:cNvSpPr txBox="1"/>
+          <p:nvPr/>
+        </p:nvSpPr>
+        <p:spPr>
+          <a:xfrm>
+            <a:off x="2522375" y="524445"/>
+            <a:ext cx="7147249" cy="458780"/>
+          </a:xfrm>
+          <a:prstGeom prst="rect">
+            <a:avLst/>
+          </a:prstGeom>
+          <a:noFill/>
+        </p:spPr>
+        <p:txBody>
+          <a:bodyPr wrap="square" rtlCol="0">
+            <a:spAutoFit/>
+          </a:bodyPr>
+          <a:lstStyle/>
+          <a:p>
+            <a:pPr algn="ctr">
+              <a:lnSpc>
+                <a:spcPct val="107000"/>
+              </a:lnSpc>
+              <a:spcAft>
+                <a:spcPts val="800"/>
+              </a:spcAft>
+            </a:pPr>
+            <a:r>
+              <a:rPr lang="en-US" sz="2400" b="1" spc="75" dirty="0">
+                <a:solidFill>
+                  <a:srgbClr val="000000"/>
+                </a:solidFill>
+                <a:latin typeface="Arial" panose="020B0604020202020204" pitchFamily="34" charset="0"/>
+                <a:ea typeface="Times New Roman" panose="02020603050405020304" pitchFamily="18" charset="0"/>
+                <a:cs typeface="Arial" panose="020B0604020202020204" pitchFamily="34" charset="0"/>
+              </a:rPr>
+              <a:t>PENDAHULUAN </a:t>
+            </a:r>
+            <a:endParaRPr lang="en-ID" sz="2400" spc="75" dirty="0">
+              <a:solidFill>
+                <a:srgbClr val="000000"/>
+              </a:solidFill>
+              <a:effectLst/>
+              <a:latin typeface="Arial" panose="020B0604020202020204" pitchFamily="34" charset="0"/>
+              <a:ea typeface="Times New Roman" panose="02020603050405020304" pitchFamily="18" charset="0"/>
+              <a:cs typeface="Arial" panose="020B0604020202020204" pitchFamily="34" charset="0"/>
+            </a:endParaRPr>
+          </a:p>
+        </p:txBody>
+      </p:sp>
+      <p:pic>
+        <p:nvPicPr>
+          <p:cNvPr id="3" name="Picture 2">
+            <a:extLst>
+              <a:ext uri="{FF2B5EF4-FFF2-40B4-BE49-F238E27FC236}">
+                <a16:creationId xmlns:a16="http://schemas.microsoft.com/office/drawing/2014/main" id="{7F066D29-7D8F-FA43-C481-2058A9CC61DC}"/>
+              </a:ext>
+            </a:extLst>
+          </p:cNvPr>
+          <p:cNvPicPr>
+            <a:picLocks noChangeAspect="1"/>
+          </p:cNvPicPr>
+          <p:nvPr/>
+        </p:nvPicPr>
+        <p:blipFill>
+          <a:blip r:embed="rId2">
+            <a:extLst>
+              <a:ext uri="{28A0092B-C50C-407E-A947-70E740481C1C}">
+                <a14:useLocalDpi xmlns:a14="http://schemas.microsoft.com/office/drawing/2010/main" val="0"/>
+              </a:ext>
+            </a:extLst>
+          </a:blip>
+          <a:stretch>
+            <a:fillRect/>
+          </a:stretch>
+        </p:blipFill>
+        <p:spPr>
+          <a:xfrm>
+            <a:off x="11161903" y="5812413"/>
+            <a:ext cx="922432" cy="922432"/>
+          </a:xfrm>
+          <a:prstGeom prst="rect">
+            <a:avLst/>
+          </a:prstGeom>
+        </p:spPr>
+      </p:pic>
+      <p:graphicFrame>
+        <p:nvGraphicFramePr>
+          <p:cNvPr id="4" name="Table 6">
+            <a:extLst>
+              <a:ext uri="{FF2B5EF4-FFF2-40B4-BE49-F238E27FC236}">
+                <a16:creationId xmlns:a16="http://schemas.microsoft.com/office/drawing/2014/main" id="{BBCF6BA6-0500-2FD0-9FD4-66109AB07B88}"/>
+              </a:ext>
+            </a:extLst>
+          </p:cNvPr>
+          <p:cNvGraphicFramePr>
+            <a:graphicFrameLocks noGrp="1"/>
+          </p:cNvGraphicFramePr>
+          <p:nvPr>
+            <p:extLst>
+              <p:ext uri="{D42A27DB-BD31-4B8C-83A1-F6EECF244321}">
+                <p14:modId xmlns:p14="http://schemas.microsoft.com/office/powerpoint/2010/main" val="748989524"/>
+              </p:ext>
+            </p:extLst>
+          </p:nvPr>
+        </p:nvGraphicFramePr>
+        <p:xfrm>
+          <a:off x="1440178" y="1252453"/>
+          <a:ext cx="9311642" cy="4353094"/>
+        </p:xfrm>
+        <a:graphic>
+          <a:graphicData uri="http://schemas.openxmlformats.org/drawingml/2006/table">
+            <a:tbl>
+              <a:tblPr firstRow="1" bandRow="1">
+                <a:tableStyleId>{5C22544A-7EE6-4342-B048-85BDC9FD1C3A}</a:tableStyleId>
+              </a:tblPr>
+              <a:tblGrid>
+                <a:gridCol w="4655821">
+                  <a:extLst>
+                    <a:ext uri="{9D8B030D-6E8A-4147-A177-3AD203B41FA5}">
+                      <a16:colId xmlns:a16="http://schemas.microsoft.com/office/drawing/2014/main" val="4274514598"/>
+                    </a:ext>
+                  </a:extLst>
+                </a:gridCol>
+                <a:gridCol w="4655821">
+                  <a:extLst>
+                    <a:ext uri="{9D8B030D-6E8A-4147-A177-3AD203B41FA5}">
+                      <a16:colId xmlns:a16="http://schemas.microsoft.com/office/drawing/2014/main" val="2962316481"/>
+                    </a:ext>
+                  </a:extLst>
+                </a:gridCol>
+              </a:tblGrid>
+              <a:tr h="2176547">
+                <a:tc>
+                  <a:txBody>
+                    <a:bodyPr/>
+                    <a:lstStyle/>
+                    <a:p>
+                      <a:pPr algn="ctr"/>
+                      <a:r>
+                        <a:rPr lang="en-US" sz="1600" dirty="0">
+                          <a:solidFill>
+                            <a:schemeClr val="tx1"/>
+                          </a:solidFill>
+                          <a:latin typeface="Arial" panose="020B0604020202020204" pitchFamily="34" charset="0"/>
+                          <a:cs typeface="Arial" panose="020B0604020202020204" pitchFamily="34" charset="0"/>
+                        </a:rPr>
+                        <a:t>RUMUSAN MASALAH</a:t>
+                      </a:r>
+                      <a:endParaRPr lang="en-ID" sz="1400" dirty="0">
+                        <a:solidFill>
+                          <a:schemeClr val="tx1"/>
+                        </a:solidFill>
+                        <a:latin typeface="Arial" panose="020B0604020202020204" pitchFamily="34" charset="0"/>
+                        <a:cs typeface="Arial" panose="020B0604020202020204" pitchFamily="34" charset="0"/>
+                      </a:endParaRPr>
+                    </a:p>
+                  </a:txBody>
+                  <a:tcPr>
+                    <a:lnR w="38100" cap="flat" cmpd="sng" algn="ctr">
+                      <a:solidFill>
+                        <a:schemeClr val="tx1"/>
+                      </a:solidFill>
+                      <a:prstDash val="solid"/>
+                      <a:round/>
+                      <a:headEnd type="none" w="med" len="med"/>
+                      <a:tailEnd type="none" w="med" len="med"/>
+                    </a:lnR>
+                    <a:lnB w="38100" cap="flat" cmpd="sng" algn="ctr">
+                      <a:solidFill>
+                        <a:schemeClr val="tx1"/>
+                      </a:solidFill>
+                      <a:prstDash val="solid"/>
+                      <a:round/>
+                      <a:headEnd type="none" w="med" len="med"/>
+                      <a:tailEnd type="none" w="med" len="med"/>
+                    </a:lnB>
+                    <a:noFill/>
+                  </a:tcPr>
+                </a:tc>
+                <a:tc>
+                  <a:txBody>
+                    <a:bodyPr/>
+                    <a:lstStyle/>
+                    <a:p>
+                      <a:endParaRPr lang="en-ID" dirty="0"/>
+                    </a:p>
+                  </a:txBody>
+                  <a:tcPr>
+                    <a:lnL w="38100" cap="flat" cmpd="sng" algn="ctr">
+                      <a:solidFill>
+                        <a:schemeClr val="tx1"/>
+                      </a:solidFill>
+                      <a:prstDash val="solid"/>
+                      <a:round/>
+                      <a:headEnd type="none" w="med" len="med"/>
+                      <a:tailEnd type="none" w="med" len="med"/>
+                    </a:lnL>
+                    <a:lnB w="38100" cap="flat" cmpd="sng" algn="ctr">
+                      <a:solidFill>
+                        <a:schemeClr val="tx1"/>
+                      </a:solidFill>
+                      <a:prstDash val="solid"/>
+                      <a:round/>
+                      <a:headEnd type="none" w="med" len="med"/>
+                      <a:tailEnd type="none" w="med" len="med"/>
+                    </a:lnB>
+                    <a:noFill/>
+                  </a:tcPr>
+                </a:tc>
+                <a:extLst>
+                  <a:ext uri="{0D108BD9-81ED-4DB2-BD59-A6C34878D82A}">
+                    <a16:rowId xmlns:a16="http://schemas.microsoft.com/office/drawing/2014/main" val="2404183944"/>
+                  </a:ext>
+                </a:extLst>
+              </a:tr>
+              <a:tr h="2176547">
+                <a:tc>
+                  <a:txBody>
+                    <a:bodyPr/>
+                    <a:lstStyle/>
+                    <a:p>
+                      <a:endParaRPr lang="en-ID"/>
+                    </a:p>
+                  </a:txBody>
+                  <a:tcPr>
+                    <a:lnR w="38100" cap="flat" cmpd="sng" algn="ctr">
+                      <a:solidFill>
+                        <a:schemeClr val="tx1"/>
+                      </a:solidFill>
+                      <a:prstDash val="solid"/>
+                      <a:round/>
+                      <a:headEnd type="none" w="med" len="med"/>
+                      <a:tailEnd type="none" w="med" len="med"/>
+                    </a:lnR>
+                    <a:lnT w="38100" cap="flat" cmpd="sng" algn="ctr">
+                      <a:solidFill>
+                        <a:schemeClr val="tx1"/>
+                      </a:solidFill>
+                      <a:prstDash val="solid"/>
+                      <a:round/>
+                      <a:headEnd type="none" w="med" len="med"/>
+                      <a:tailEnd type="none" w="med" len="med"/>
+                    </a:lnT>
+                    <a:noFill/>
+                  </a:tcPr>
+                </a:tc>
+                <a:tc>
+                  <a:txBody>
+                    <a:bodyPr/>
+                    <a:lstStyle/>
+                    <a:p>
+                      <a:endParaRPr lang="en-ID" dirty="0"/>
+                    </a:p>
+                  </a:txBody>
+                  <a:tcPr>
+                    <a:lnL w="38100" cap="flat" cmpd="sng" algn="ctr">
+                      <a:solidFill>
+                        <a:schemeClr val="tx1"/>
+                      </a:solidFill>
+                      <a:prstDash val="solid"/>
+                      <a:round/>
+                      <a:headEnd type="none" w="med" len="med"/>
+                      <a:tailEnd type="none" w="med" len="med"/>
+                    </a:lnL>
+                    <a:lnT w="38100" cap="flat" cmpd="sng" algn="ctr">
+                      <a:solidFill>
+                        <a:schemeClr val="tx1"/>
+                      </a:solidFill>
+                      <a:prstDash val="solid"/>
+                      <a:round/>
+                      <a:headEnd type="none" w="med" len="med"/>
+                      <a:tailEnd type="none" w="med" len="med"/>
+                    </a:lnT>
+                    <a:noFill/>
+                  </a:tcPr>
+                </a:tc>
+                <a:extLst>
+                  <a:ext uri="{0D108BD9-81ED-4DB2-BD59-A6C34878D82A}">
+                    <a16:rowId xmlns:a16="http://schemas.microsoft.com/office/drawing/2014/main" val="2247436212"/>
+                  </a:ext>
+                </a:extLst>
+              </a:tr>
+            </a:tbl>
+          </a:graphicData>
+        </a:graphic>
+      </p:graphicFrame>
+      <p:sp>
+        <p:nvSpPr>
+          <p:cNvPr id="9" name="TextBox 8">
+            <a:extLst>
+              <a:ext uri="{FF2B5EF4-FFF2-40B4-BE49-F238E27FC236}">
+                <a16:creationId xmlns:a16="http://schemas.microsoft.com/office/drawing/2014/main" id="{80A57D68-CBCF-D235-F676-F3B6E2DFC6A9}"/>
+              </a:ext>
+            </a:extLst>
+          </p:cNvPr>
+          <p:cNvSpPr txBox="1"/>
+          <p:nvPr/>
+        </p:nvSpPr>
+        <p:spPr>
+          <a:xfrm>
+            <a:off x="2611843" y="1728133"/>
+            <a:ext cx="2956560" cy="1077218"/>
+          </a:xfrm>
+          <a:prstGeom prst="rect">
+            <a:avLst/>
+          </a:prstGeom>
+          <a:noFill/>
+        </p:spPr>
+        <p:txBody>
+          <a:bodyPr wrap="square" rtlCol="0">
+            <a:spAutoFit/>
+          </a:bodyPr>
+          <a:lstStyle/>
+          <a:p>
+            <a:pPr marL="342900" indent="-342900" algn="just">
+              <a:buFont typeface="Courier New" panose="02070309020205020404" pitchFamily="49" charset="0"/>
+              <a:buChar char="o"/>
+            </a:pPr>
+            <a:r>
+              <a:rPr lang="en-US" sz="1600" dirty="0" err="1">
+                <a:latin typeface="Arial" panose="020B0604020202020204" pitchFamily="34" charset="0"/>
+                <a:cs typeface="Arial" panose="020B0604020202020204" pitchFamily="34" charset="0"/>
+              </a:rPr>
+              <a:t>Presensi</a:t>
+            </a:r>
+            <a:r>
+              <a:rPr lang="en-US" sz="1600" dirty="0">
+                <a:latin typeface="Arial" panose="020B0604020202020204" pitchFamily="34" charset="0"/>
+                <a:cs typeface="Arial" panose="020B0604020202020204" pitchFamily="34" charset="0"/>
+              </a:rPr>
+              <a:t> </a:t>
+            </a:r>
+            <a:r>
+              <a:rPr lang="en-US" sz="1600" dirty="0" err="1">
+                <a:latin typeface="Arial" panose="020B0604020202020204" pitchFamily="34" charset="0"/>
+                <a:cs typeface="Arial" panose="020B0604020202020204" pitchFamily="34" charset="0"/>
+              </a:rPr>
+              <a:t>menggunakan</a:t>
+            </a:r>
+            <a:r>
+              <a:rPr lang="en-US" sz="1600" dirty="0">
+                <a:latin typeface="Arial" panose="020B0604020202020204" pitchFamily="34" charset="0"/>
+                <a:cs typeface="Arial" panose="020B0604020202020204" pitchFamily="34" charset="0"/>
+              </a:rPr>
+              <a:t> </a:t>
+            </a:r>
+            <a:r>
+              <a:rPr lang="en-US" sz="1600" dirty="0" err="1">
+                <a:latin typeface="Arial" panose="020B0604020202020204" pitchFamily="34" charset="0"/>
+                <a:cs typeface="Arial" panose="020B0604020202020204" pitchFamily="34" charset="0"/>
+              </a:rPr>
+              <a:t>cara</a:t>
+            </a:r>
+            <a:r>
+              <a:rPr lang="en-US" sz="1600" dirty="0">
+                <a:latin typeface="Arial" panose="020B0604020202020204" pitchFamily="34" charset="0"/>
+                <a:cs typeface="Arial" panose="020B0604020202020204" pitchFamily="34" charset="0"/>
+              </a:rPr>
+              <a:t> </a:t>
+            </a:r>
+            <a:r>
+              <a:rPr lang="en-US" sz="1600" dirty="0" err="1">
+                <a:latin typeface="Arial" panose="020B0604020202020204" pitchFamily="34" charset="0"/>
+                <a:cs typeface="Arial" panose="020B0604020202020204" pitchFamily="34" charset="0"/>
+              </a:rPr>
+              <a:t>konvensional</a:t>
+            </a:r>
+            <a:endParaRPr lang="en-US" sz="1600" dirty="0">
+              <a:latin typeface="Arial" panose="020B0604020202020204" pitchFamily="34" charset="0"/>
+              <a:cs typeface="Arial" panose="020B0604020202020204" pitchFamily="34" charset="0"/>
+            </a:endParaRPr>
+          </a:p>
+          <a:p>
+            <a:pPr marL="342900" indent="-342900" algn="just">
+              <a:buFont typeface="Courier New" panose="02070309020205020404" pitchFamily="49" charset="0"/>
+              <a:buChar char="o"/>
+            </a:pPr>
+            <a:r>
+              <a:rPr lang="en-ID" sz="1600" dirty="0" err="1">
+                <a:latin typeface="Arial" panose="020B0604020202020204" pitchFamily="34" charset="0"/>
+                <a:cs typeface="Arial" panose="020B0604020202020204" pitchFamily="34" charset="0"/>
+              </a:rPr>
+              <a:t>Kedisiplinan</a:t>
+            </a:r>
+            <a:r>
+              <a:rPr lang="en-ID" sz="1600" dirty="0">
+                <a:latin typeface="Arial" panose="020B0604020202020204" pitchFamily="34" charset="0"/>
+                <a:cs typeface="Arial" panose="020B0604020202020204" pitchFamily="34" charset="0"/>
+              </a:rPr>
+              <a:t> </a:t>
+            </a:r>
+            <a:r>
+              <a:rPr lang="en-ID" sz="1600" dirty="0" err="1">
+                <a:latin typeface="Arial" panose="020B0604020202020204" pitchFamily="34" charset="0"/>
+                <a:cs typeface="Arial" panose="020B0604020202020204" pitchFamily="34" charset="0"/>
+              </a:rPr>
+              <a:t>pegawai</a:t>
+            </a:r>
+            <a:r>
+              <a:rPr lang="en-ID" sz="1600" dirty="0">
+                <a:latin typeface="Arial" panose="020B0604020202020204" pitchFamily="34" charset="0"/>
+                <a:cs typeface="Arial" panose="020B0604020202020204" pitchFamily="34" charset="0"/>
+              </a:rPr>
+              <a:t> </a:t>
+            </a:r>
+          </a:p>
+          <a:p>
+            <a:pPr marL="342900" indent="-342900" algn="just">
+              <a:buFont typeface="Courier New" panose="02070309020205020404" pitchFamily="49" charset="0"/>
+              <a:buChar char="o"/>
+            </a:pPr>
+            <a:r>
+              <a:rPr lang="en-US" sz="1600" dirty="0" err="1">
+                <a:latin typeface="Arial" panose="020B0604020202020204" pitchFamily="34" charset="0"/>
+                <a:cs typeface="Arial" panose="020B0604020202020204" pitchFamily="34" charset="0"/>
+              </a:rPr>
+              <a:t>Pengambilan</a:t>
+            </a:r>
+            <a:r>
+              <a:rPr lang="en-US" sz="1600" dirty="0">
+                <a:latin typeface="Arial" panose="020B0604020202020204" pitchFamily="34" charset="0"/>
+                <a:cs typeface="Arial" panose="020B0604020202020204" pitchFamily="34" charset="0"/>
+              </a:rPr>
+              <a:t> </a:t>
+            </a:r>
+            <a:r>
+              <a:rPr lang="en-US" sz="1600" dirty="0" err="1">
+                <a:latin typeface="Arial" panose="020B0604020202020204" pitchFamily="34" charset="0"/>
+                <a:cs typeface="Arial" panose="020B0604020202020204" pitchFamily="34" charset="0"/>
+              </a:rPr>
+              <a:t>keputusan</a:t>
+            </a:r>
+            <a:r>
+              <a:rPr lang="en-US" sz="1600" dirty="0">
+                <a:latin typeface="Arial" panose="020B0604020202020204" pitchFamily="34" charset="0"/>
+                <a:cs typeface="Arial" panose="020B0604020202020204" pitchFamily="34" charset="0"/>
+              </a:rPr>
+              <a:t> </a:t>
+            </a:r>
+            <a:endParaRPr lang="en-ID" sz="1600" dirty="0">
+              <a:latin typeface="Arial" panose="020B0604020202020204" pitchFamily="34" charset="0"/>
+              <a:cs typeface="Arial" panose="020B0604020202020204" pitchFamily="34" charset="0"/>
+            </a:endParaRPr>
+          </a:p>
+        </p:txBody>
+      </p:sp>
+      <p:pic>
+        <p:nvPicPr>
+          <p:cNvPr id="8" name="Picture 7">
+            <a:extLst>
+              <a:ext uri="{FF2B5EF4-FFF2-40B4-BE49-F238E27FC236}">
+                <a16:creationId xmlns:a16="http://schemas.microsoft.com/office/drawing/2014/main" id="{BF6F8536-85DB-DF14-A594-B95FED9961CF}"/>
+              </a:ext>
+            </a:extLst>
+          </p:cNvPr>
+          <p:cNvPicPr>
+            <a:picLocks noChangeAspect="1"/>
+          </p:cNvPicPr>
+          <p:nvPr/>
+        </p:nvPicPr>
+        <p:blipFill>
+          <a:blip r:embed="rId3">
+            <a:lum bright="70000" contrast="-70000"/>
+            <a:extLst>
+              <a:ext uri="{28A0092B-C50C-407E-A947-70E740481C1C}">
+                <a14:useLocalDpi xmlns:a14="http://schemas.microsoft.com/office/drawing/2010/main" val="0"/>
+              </a:ext>
+            </a:extLst>
+          </a:blip>
+          <a:stretch>
+            <a:fillRect/>
+          </a:stretch>
+        </p:blipFill>
+        <p:spPr>
+          <a:xfrm>
+            <a:off x="1242215" y="1728133"/>
+            <a:ext cx="1280160" cy="1280160"/>
+          </a:xfrm>
+          <a:prstGeom prst="rect">
+            <a:avLst/>
+          </a:prstGeom>
+          <a:noFill/>
+          <a:ln>
+            <a:noFill/>
+          </a:ln>
+        </p:spPr>
+      </p:pic>
+      <p:pic>
+        <p:nvPicPr>
+          <p:cNvPr id="11" name="Picture 10">
+            <a:extLst>
+              <a:ext uri="{FF2B5EF4-FFF2-40B4-BE49-F238E27FC236}">
+                <a16:creationId xmlns:a16="http://schemas.microsoft.com/office/drawing/2014/main" id="{8400DBD7-970A-999E-3B0C-4CB5D0995651}"/>
+              </a:ext>
+            </a:extLst>
+          </p:cNvPr>
+          <p:cNvPicPr>
+            <a:picLocks noChangeAspect="1"/>
+          </p:cNvPicPr>
+          <p:nvPr/>
+        </p:nvPicPr>
+        <p:blipFill>
+          <a:blip r:embed="rId4">
+            <a:lum bright="70000" contrast="-70000"/>
+            <a:extLst>
+              <a:ext uri="{28A0092B-C50C-407E-A947-70E740481C1C}">
+                <a14:useLocalDpi xmlns:a14="http://schemas.microsoft.com/office/drawing/2010/main" val="0"/>
+              </a:ext>
+            </a:extLst>
+          </a:blip>
+          <a:stretch>
+            <a:fillRect/>
+          </a:stretch>
+        </p:blipFill>
+        <p:spPr>
+          <a:xfrm>
+            <a:off x="6239871" y="1626662"/>
+            <a:ext cx="1280160" cy="1280160"/>
+          </a:xfrm>
+          <a:prstGeom prst="rect">
+            <a:avLst/>
+          </a:prstGeom>
+        </p:spPr>
+      </p:pic>
+    </p:spTree>
+    <p:extLst>
+      <p:ext uri="{BB962C8B-B14F-4D97-AF65-F5344CB8AC3E}">
+        <p14:creationId xmlns:p14="http://schemas.microsoft.com/office/powerpoint/2010/main" val="507316956"/>
+      </p:ext>
+    </p:extLst>
+  </p:cSld>
+  <p:clrMapOvr>
+    <a:masterClrMapping/>
+  </p:clrMapOvr>
+  <mc:AlternateContent xmlns:mc="http://schemas.openxmlformats.org/markup-compatibility/2006">
+    <mc:Choice xmlns:p159="http://schemas.microsoft.com/office/powerpoint/2015/09/main" Requires="p159">
+      <p:transition xmlns:p14="http://schemas.microsoft.com/office/powerpoint/2010/main" spd="slow" p14:dur="2000">
+        <p159:morph option="byObject"/>
+      </p:transition>
+    </mc:Choice>
+    <mc:Fallback>
+      <p:transition spd="slow">
+        <p:fade/>
+      </p:transition>
+    </mc:Fallback>
+  </mc:AlternateContent>
+</p:sld>
+</file>
+
+<file path=ppt/slides/slide4.xml><?xml version="1.0" encoding="utf-8"?>
+<p:sld xmlns:a="http://schemas.openxmlformats.org/drawingml/2006/main" xmlns:r="http://schemas.openxmlformats.org/officeDocument/2006/relationships" xmlns:p="http://schemas.openxmlformats.org/presentationml/2006/main">
+  <p:cSld>
+    <p:bg>
+      <p:bgPr>
+        <a:solidFill>
+          <a:srgbClr val="5CA0CA"/>
+        </a:solidFill>
+        <a:effectLst/>
+      </p:bgPr>
+    </p:bg>
+    <p:spTree>
+      <p:nvGrpSpPr>
+        <p:cNvPr id="1" name=""/>
+        <p:cNvGrpSpPr/>
+        <p:nvPr/>
+      </p:nvGrpSpPr>
+      <p:grpSpPr>
+        <a:xfrm>
+          <a:off x="0" y="0"/>
+          <a:ext cx="0" cy="0"/>
+          <a:chOff x="0" y="0"/>
+          <a:chExt cx="0" cy="0"/>
+        </a:xfrm>
+      </p:grpSpPr>
+      <p:sp>
+        <p:nvSpPr>
           <p:cNvPr id="2" name="Title 1">
             <a:extLst>
               <a:ext uri="{FF2B5EF4-FFF2-40B4-BE49-F238E27FC236}">

</xml_diff>